<commit_message>
Ran the program to get latest data for today.
</commit_message>
<xml_diff>
--- a/Project1-Presentation.pptx
+++ b/Project1-Presentation.pptx
@@ -9,11 +9,12 @@
     <p:sldId id="257" r:id="rId3"/>
     <p:sldId id="261" r:id="rId4"/>
     <p:sldId id="262" r:id="rId5"/>
-    <p:sldId id="258" r:id="rId6"/>
-    <p:sldId id="263" r:id="rId7"/>
-    <p:sldId id="264" r:id="rId8"/>
-    <p:sldId id="259" r:id="rId9"/>
-    <p:sldId id="260" r:id="rId10"/>
+    <p:sldId id="265" r:id="rId6"/>
+    <p:sldId id="258" r:id="rId7"/>
+    <p:sldId id="263" r:id="rId8"/>
+    <p:sldId id="264" r:id="rId9"/>
+    <p:sldId id="259" r:id="rId10"/>
+    <p:sldId id="260" r:id="rId11"/>
   </p:sldIdLst>
   <p:sldSz cx="12192000" cy="6858000"/>
   <p:notesSz cx="6858000" cy="9144000"/>
@@ -290,7 +291,7 @@
           <a:p>
             <a:fld id="{48A87A34-81AB-432B-8DAE-1953F412C126}" type="datetimeFigureOut">
               <a:rPr lang="en-US" dirty="0"/>
-              <a:t>7/4/18</a:t>
+              <a:t>7/7/18</a:t>
             </a:fld>
             <a:endParaRPr lang="en-US" dirty="0"/>
           </a:p>
@@ -552,7 +553,7 @@
           <a:p>
             <a:fld id="{48A87A34-81AB-432B-8DAE-1953F412C126}" type="datetimeFigureOut">
               <a:rPr lang="en-US" dirty="0"/>
-              <a:t>7/4/18</a:t>
+              <a:t>7/7/18</a:t>
             </a:fld>
             <a:endParaRPr lang="en-US" dirty="0"/>
           </a:p>
@@ -779,7 +780,7 @@
             <a:fld id="{48A87A34-81AB-432B-8DAE-1953F412C126}" type="datetimeFigureOut">
               <a:rPr lang="en-US" dirty="0"/>
               <a:pPr/>
-              <a:t>7/4/18</a:t>
+              <a:t>7/7/18</a:t>
             </a:fld>
             <a:endParaRPr lang="en-US" dirty="0"/>
           </a:p>
@@ -1085,7 +1086,7 @@
             <a:fld id="{48A87A34-81AB-432B-8DAE-1953F412C126}" type="datetimeFigureOut">
               <a:rPr lang="en-US" dirty="0"/>
               <a:pPr/>
-              <a:t>7/4/18</a:t>
+              <a:t>7/7/18</a:t>
             </a:fld>
             <a:endParaRPr lang="en-US" dirty="0"/>
           </a:p>
@@ -1554,7 +1555,7 @@
             <a:fld id="{48A87A34-81AB-432B-8DAE-1953F412C126}" type="datetimeFigureOut">
               <a:rPr lang="en-US" dirty="0"/>
               <a:pPr/>
-              <a:t>7/4/18</a:t>
+              <a:t>7/7/18</a:t>
             </a:fld>
             <a:endParaRPr lang="en-US" dirty="0"/>
           </a:p>
@@ -2096,7 +2097,7 @@
           <a:p>
             <a:fld id="{48A87A34-81AB-432B-8DAE-1953F412C126}" type="datetimeFigureOut">
               <a:rPr lang="en-US" dirty="0"/>
-              <a:t>7/4/18</a:t>
+              <a:t>7/7/18</a:t>
             </a:fld>
             <a:endParaRPr lang="en-US" dirty="0"/>
           </a:p>
@@ -2865,7 +2866,7 @@
           <a:p>
             <a:fld id="{48A87A34-81AB-432B-8DAE-1953F412C126}" type="datetimeFigureOut">
               <a:rPr lang="en-US" dirty="0"/>
-              <a:t>7/4/18</a:t>
+              <a:t>7/7/18</a:t>
             </a:fld>
             <a:endParaRPr lang="en-US" dirty="0"/>
           </a:p>
@@ -3035,7 +3036,7 @@
           <a:p>
             <a:fld id="{48A87A34-81AB-432B-8DAE-1953F412C126}" type="datetimeFigureOut">
               <a:rPr lang="en-US" dirty="0"/>
-              <a:t>7/4/18</a:t>
+              <a:t>7/7/18</a:t>
             </a:fld>
             <a:endParaRPr lang="en-US" dirty="0"/>
           </a:p>
@@ -3254,7 +3255,7 @@
             <a:fld id="{48A87A34-81AB-432B-8DAE-1953F412C126}" type="datetimeFigureOut">
               <a:rPr lang="en-US" dirty="0"/>
               <a:pPr/>
-              <a:t>7/4/18</a:t>
+              <a:t>7/7/18</a:t>
             </a:fld>
             <a:endParaRPr lang="en-US" dirty="0"/>
           </a:p>
@@ -3429,7 +3430,7 @@
           <a:p>
             <a:fld id="{48A87A34-81AB-432B-8DAE-1953F412C126}" type="datetimeFigureOut">
               <a:rPr lang="en-US" dirty="0"/>
-              <a:t>7/4/18</a:t>
+              <a:t>7/7/18</a:t>
             </a:fld>
             <a:endParaRPr lang="en-US" dirty="0"/>
           </a:p>
@@ -3714,7 +3715,7 @@
             <a:fld id="{48A87A34-81AB-432B-8DAE-1953F412C126}" type="datetimeFigureOut">
               <a:rPr lang="en-US" dirty="0"/>
               <a:pPr/>
-              <a:t>7/4/18</a:t>
+              <a:t>7/7/18</a:t>
             </a:fld>
             <a:endParaRPr lang="en-US" dirty="0"/>
           </a:p>
@@ -3951,7 +3952,7 @@
           <a:p>
             <a:fld id="{48A87A34-81AB-432B-8DAE-1953F412C126}" type="datetimeFigureOut">
               <a:rPr lang="en-US" dirty="0"/>
-              <a:t>7/4/18</a:t>
+              <a:t>7/7/18</a:t>
             </a:fld>
             <a:endParaRPr lang="en-US" dirty="0"/>
           </a:p>
@@ -4325,7 +4326,7 @@
           <a:p>
             <a:fld id="{48A87A34-81AB-432B-8DAE-1953F412C126}" type="datetimeFigureOut">
               <a:rPr lang="en-US" dirty="0"/>
-              <a:t>7/4/18</a:t>
+              <a:t>7/7/18</a:t>
             </a:fld>
             <a:endParaRPr lang="en-US" dirty="0"/>
           </a:p>
@@ -4438,7 +4439,7 @@
           <a:p>
             <a:fld id="{48A87A34-81AB-432B-8DAE-1953F412C126}" type="datetimeFigureOut">
               <a:rPr lang="en-US" dirty="0"/>
-              <a:t>7/4/18</a:t>
+              <a:t>7/7/18</a:t>
             </a:fld>
             <a:endParaRPr lang="en-US" dirty="0"/>
           </a:p>
@@ -4528,7 +4529,7 @@
           <a:p>
             <a:fld id="{48A87A34-81AB-432B-8DAE-1953F412C126}" type="datetimeFigureOut">
               <a:rPr lang="en-US" dirty="0"/>
-              <a:t>7/4/18</a:t>
+              <a:t>7/7/18</a:t>
             </a:fld>
             <a:endParaRPr lang="en-US" dirty="0"/>
           </a:p>
@@ -4772,7 +4773,7 @@
           <a:p>
             <a:fld id="{48A87A34-81AB-432B-8DAE-1953F412C126}" type="datetimeFigureOut">
               <a:rPr lang="en-US" dirty="0"/>
-              <a:t>7/4/18</a:t>
+              <a:t>7/7/18</a:t>
             </a:fld>
             <a:endParaRPr lang="en-US" dirty="0"/>
           </a:p>
@@ -5024,7 +5025,7 @@
           <a:p>
             <a:fld id="{48A87A34-81AB-432B-8DAE-1953F412C126}" type="datetimeFigureOut">
               <a:rPr lang="en-US" dirty="0"/>
-              <a:t>7/4/18</a:t>
+              <a:t>7/7/18</a:t>
             </a:fld>
             <a:endParaRPr lang="en-US" dirty="0"/>
           </a:p>
@@ -5263,7 +5264,7 @@
             <a:fld id="{48A87A34-81AB-432B-8DAE-1953F412C126}" type="datetimeFigureOut">
               <a:rPr lang="en-US" dirty="0"/>
               <a:pPr/>
-              <a:t>7/4/18</a:t>
+              <a:t>7/7/18</a:t>
             </a:fld>
             <a:endParaRPr lang="en-US" dirty="0"/>
           </a:p>
@@ -5747,6 +5748,92 @@
 </p:sld>
 </file>
 
+<file path=ppt/slides/slide10.xml><?xml version="1.0" encoding="utf-8"?>
+<p:sld xmlns:a="http://schemas.openxmlformats.org/drawingml/2006/main" xmlns:r="http://schemas.openxmlformats.org/officeDocument/2006/relationships" xmlns:p="http://schemas.openxmlformats.org/presentationml/2006/main">
+  <p:cSld>
+    <p:spTree>
+      <p:nvGrpSpPr>
+        <p:cNvPr id="1" name=""/>
+        <p:cNvGrpSpPr/>
+        <p:nvPr/>
+      </p:nvGrpSpPr>
+      <p:grpSpPr>
+        <a:xfrm>
+          <a:off x="0" y="0"/>
+          <a:ext cx="0" cy="0"/>
+          <a:chOff x="0" y="0"/>
+          <a:chExt cx="0" cy="0"/>
+        </a:xfrm>
+      </p:grpSpPr>
+      <p:sp>
+        <p:nvSpPr>
+          <p:cNvPr id="2" name="Title 1">
+            <a:extLst>
+              <a:ext uri="{FF2B5EF4-FFF2-40B4-BE49-F238E27FC236}">
+                <a16:creationId xmlns:a16="http://schemas.microsoft.com/office/drawing/2014/main" id="{98569654-12C3-2F4F-BA71-ACE02C875588}"/>
+              </a:ext>
+            </a:extLst>
+          </p:cNvPr>
+          <p:cNvSpPr>
+            <a:spLocks noGrp="1"/>
+          </p:cNvSpPr>
+          <p:nvPr>
+            <p:ph type="title"/>
+          </p:nvPr>
+        </p:nvSpPr>
+        <p:spPr/>
+        <p:txBody>
+          <a:bodyPr/>
+          <a:lstStyle/>
+          <a:p>
+            <a:r>
+              <a:rPr lang="en-US" dirty="0"/>
+              <a:t>Q &amp; A</a:t>
+            </a:r>
+          </a:p>
+        </p:txBody>
+      </p:sp>
+      <p:sp>
+        <p:nvSpPr>
+          <p:cNvPr id="3" name="Content Placeholder 2">
+            <a:extLst>
+              <a:ext uri="{FF2B5EF4-FFF2-40B4-BE49-F238E27FC236}">
+                <a16:creationId xmlns:a16="http://schemas.microsoft.com/office/drawing/2014/main" id="{EDF538AD-3DBF-0740-AEA6-A0D34315502D}"/>
+              </a:ext>
+            </a:extLst>
+          </p:cNvPr>
+          <p:cNvSpPr>
+            <a:spLocks noGrp="1"/>
+          </p:cNvSpPr>
+          <p:nvPr>
+            <p:ph idx="1"/>
+          </p:nvPr>
+        </p:nvSpPr>
+        <p:spPr/>
+        <p:txBody>
+          <a:bodyPr/>
+          <a:lstStyle/>
+          <a:p>
+            <a:r>
+              <a:rPr lang="en-US" dirty="0"/>
+              <a:t>Thanks!</a:t>
+            </a:r>
+          </a:p>
+        </p:txBody>
+      </p:sp>
+    </p:spTree>
+    <p:extLst>
+      <p:ext uri="{BB962C8B-B14F-4D97-AF65-F5344CB8AC3E}">
+        <p14:creationId xmlns:p14="http://schemas.microsoft.com/office/powerpoint/2010/main" val="489272128"/>
+      </p:ext>
+    </p:extLst>
+  </p:cSld>
+  <p:clrMapOvr>
+    <a:masterClrMapping/>
+  </p:clrMapOvr>
+</p:sld>
+</file>
+
 <file path=ppt/slides/slide2.xml><?xml version="1.0" encoding="utf-8"?>
 <p:sld xmlns:a="http://schemas.openxmlformats.org/drawingml/2006/main" xmlns:r="http://schemas.openxmlformats.org/officeDocument/2006/relationships" xmlns:p="http://schemas.openxmlformats.org/presentationml/2006/main">
   <p:cSld>
@@ -6038,10 +6125,10 @@
       </p:sp>
       <p:pic>
         <p:nvPicPr>
-          <p:cNvPr id="9" name="Content Placeholder 8">
+          <p:cNvPr id="5" name="Content Placeholder 4">
             <a:extLst>
               <a:ext uri="{FF2B5EF4-FFF2-40B4-BE49-F238E27FC236}">
-                <a16:creationId xmlns:a16="http://schemas.microsoft.com/office/drawing/2014/main" id="{F9B843DF-77C8-774D-B462-39418AD6C753}"/>
+                <a16:creationId xmlns:a16="http://schemas.microsoft.com/office/drawing/2014/main" id="{09B1C30F-66EB-9D45-AAE7-7A5B545BA9EB}"/>
               </a:ext>
             </a:extLst>
           </p:cNvPr>
@@ -6125,10 +6212,10 @@
       </p:sp>
       <p:pic>
         <p:nvPicPr>
-          <p:cNvPr id="9" name="Content Placeholder 8">
+          <p:cNvPr id="5" name="Content Placeholder 4">
             <a:extLst>
               <a:ext uri="{FF2B5EF4-FFF2-40B4-BE49-F238E27FC236}">
-                <a16:creationId xmlns:a16="http://schemas.microsoft.com/office/drawing/2014/main" id="{E900DC72-6764-B54F-AD7E-95AF9EF5C69F}"/>
+                <a16:creationId xmlns:a16="http://schemas.microsoft.com/office/drawing/2014/main" id="{0CC0F213-21B0-F24C-8BE3-C308E4D86E15}"/>
               </a:ext>
             </a:extLst>
           </p:cNvPr>
@@ -6166,6 +6253,93 @@
 </file>
 
 <file path=ppt/slides/slide5.xml><?xml version="1.0" encoding="utf-8"?>
+<p:sld xmlns:a="http://schemas.openxmlformats.org/drawingml/2006/main" xmlns:r="http://schemas.openxmlformats.org/officeDocument/2006/relationships" xmlns:p="http://schemas.openxmlformats.org/presentationml/2006/main">
+  <p:cSld>
+    <p:spTree>
+      <p:nvGrpSpPr>
+        <p:cNvPr id="1" name=""/>
+        <p:cNvGrpSpPr/>
+        <p:nvPr/>
+      </p:nvGrpSpPr>
+      <p:grpSpPr>
+        <a:xfrm>
+          <a:off x="0" y="0"/>
+          <a:ext cx="0" cy="0"/>
+          <a:chOff x="0" y="0"/>
+          <a:chExt cx="0" cy="0"/>
+        </a:xfrm>
+      </p:grpSpPr>
+      <p:sp>
+        <p:nvSpPr>
+          <p:cNvPr id="2" name="Title 1">
+            <a:extLst>
+              <a:ext uri="{FF2B5EF4-FFF2-40B4-BE49-F238E27FC236}">
+                <a16:creationId xmlns:a16="http://schemas.microsoft.com/office/drawing/2014/main" id="{2B855A24-1350-8546-B89D-89554ECC1049}"/>
+              </a:ext>
+            </a:extLst>
+          </p:cNvPr>
+          <p:cNvSpPr>
+            <a:spLocks noGrp="1"/>
+          </p:cNvSpPr>
+          <p:nvPr>
+            <p:ph type="title"/>
+          </p:nvPr>
+        </p:nvSpPr>
+        <p:spPr/>
+        <p:txBody>
+          <a:bodyPr/>
+          <a:lstStyle/>
+          <a:p>
+            <a:r>
+              <a:rPr lang="en-US" dirty="0"/>
+              <a:t>How and from where did the data come from?</a:t>
+            </a:r>
+          </a:p>
+        </p:txBody>
+      </p:sp>
+      <p:pic>
+        <p:nvPicPr>
+          <p:cNvPr id="5" name="Content Placeholder 4">
+            <a:extLst>
+              <a:ext uri="{FF2B5EF4-FFF2-40B4-BE49-F238E27FC236}">
+                <a16:creationId xmlns:a16="http://schemas.microsoft.com/office/drawing/2014/main" id="{74F48E3F-CD67-4048-8352-D077EC74FC93}"/>
+              </a:ext>
+            </a:extLst>
+          </p:cNvPr>
+          <p:cNvPicPr>
+            <a:picLocks noGrp="1" noChangeAspect="1"/>
+          </p:cNvPicPr>
+          <p:nvPr>
+            <p:ph idx="1"/>
+          </p:nvPr>
+        </p:nvPicPr>
+        <p:blipFill>
+          <a:blip r:embed="rId2"/>
+          <a:stretch>
+            <a:fillRect/>
+          </a:stretch>
+        </p:blipFill>
+        <p:spPr>
+          <a:xfrm>
+            <a:off x="2411124" y="2193925"/>
+            <a:ext cx="7369752" cy="4024313"/>
+          </a:xfrm>
+        </p:spPr>
+      </p:pic>
+    </p:spTree>
+    <p:extLst>
+      <p:ext uri="{BB962C8B-B14F-4D97-AF65-F5344CB8AC3E}">
+        <p14:creationId xmlns:p14="http://schemas.microsoft.com/office/powerpoint/2010/main" val="3585250979"/>
+      </p:ext>
+    </p:extLst>
+  </p:cSld>
+  <p:clrMapOvr>
+    <a:masterClrMapping/>
+  </p:clrMapOvr>
+</p:sld>
+</file>
+
+<file path=ppt/slides/slide6.xml><?xml version="1.0" encoding="utf-8"?>
 <p:sld xmlns:a="http://schemas.openxmlformats.org/drawingml/2006/main" xmlns:r="http://schemas.openxmlformats.org/officeDocument/2006/relationships" xmlns:p="http://schemas.openxmlformats.org/presentationml/2006/main">
   <p:cSld>
     <p:spTree>
@@ -6448,93 +6622,6 @@
 </p:sld>
 </file>
 
-<file path=ppt/slides/slide6.xml><?xml version="1.0" encoding="utf-8"?>
-<p:sld xmlns:a="http://schemas.openxmlformats.org/drawingml/2006/main" xmlns:r="http://schemas.openxmlformats.org/officeDocument/2006/relationships" xmlns:p="http://schemas.openxmlformats.org/presentationml/2006/main">
-  <p:cSld>
-    <p:spTree>
-      <p:nvGrpSpPr>
-        <p:cNvPr id="1" name=""/>
-        <p:cNvGrpSpPr/>
-        <p:nvPr/>
-      </p:nvGrpSpPr>
-      <p:grpSpPr>
-        <a:xfrm>
-          <a:off x="0" y="0"/>
-          <a:ext cx="0" cy="0"/>
-          <a:chOff x="0" y="0"/>
-          <a:chExt cx="0" cy="0"/>
-        </a:xfrm>
-      </p:grpSpPr>
-      <p:sp>
-        <p:nvSpPr>
-          <p:cNvPr id="2" name="Title 1">
-            <a:extLst>
-              <a:ext uri="{FF2B5EF4-FFF2-40B4-BE49-F238E27FC236}">
-                <a16:creationId xmlns:a16="http://schemas.microsoft.com/office/drawing/2014/main" id="{8C423E2D-7FEA-594C-92F2-E540450CB479}"/>
-              </a:ext>
-            </a:extLst>
-          </p:cNvPr>
-          <p:cNvSpPr>
-            <a:spLocks noGrp="1"/>
-          </p:cNvSpPr>
-          <p:nvPr>
-            <p:ph type="title"/>
-          </p:nvPr>
-        </p:nvSpPr>
-        <p:spPr/>
-        <p:txBody>
-          <a:bodyPr/>
-          <a:lstStyle/>
-          <a:p>
-            <a:r>
-              <a:rPr lang="en-US" dirty="0"/>
-              <a:t>World media sentiment</a:t>
-            </a:r>
-          </a:p>
-        </p:txBody>
-      </p:sp>
-      <p:pic>
-        <p:nvPicPr>
-          <p:cNvPr id="5" name="Content Placeholder 4">
-            <a:extLst>
-              <a:ext uri="{FF2B5EF4-FFF2-40B4-BE49-F238E27FC236}">
-                <a16:creationId xmlns:a16="http://schemas.microsoft.com/office/drawing/2014/main" id="{5F388F4B-A183-404F-924B-87593E0EB22D}"/>
-              </a:ext>
-            </a:extLst>
-          </p:cNvPr>
-          <p:cNvPicPr>
-            <a:picLocks noGrp="1" noChangeAspect="1"/>
-          </p:cNvPicPr>
-          <p:nvPr>
-            <p:ph idx="1"/>
-          </p:nvPr>
-        </p:nvPicPr>
-        <p:blipFill>
-          <a:blip r:embed="rId2"/>
-          <a:stretch>
-            <a:fillRect/>
-          </a:stretch>
-        </p:blipFill>
-        <p:spPr>
-          <a:xfrm>
-            <a:off x="1412433" y="2193925"/>
-            <a:ext cx="9367133" cy="4024313"/>
-          </a:xfrm>
-        </p:spPr>
-      </p:pic>
-    </p:spTree>
-    <p:extLst>
-      <p:ext uri="{BB962C8B-B14F-4D97-AF65-F5344CB8AC3E}">
-        <p14:creationId xmlns:p14="http://schemas.microsoft.com/office/powerpoint/2010/main" val="2933957669"/>
-      </p:ext>
-    </p:extLst>
-  </p:cSld>
-  <p:clrMapOvr>
-    <a:masterClrMapping/>
-  </p:clrMapOvr>
-</p:sld>
-</file>
-
 <file path=ppt/slides/slide7.xml><?xml version="1.0" encoding="utf-8"?>
 <p:sld xmlns:a="http://schemas.openxmlformats.org/drawingml/2006/main" xmlns:r="http://schemas.openxmlformats.org/officeDocument/2006/relationships" xmlns:p="http://schemas.openxmlformats.org/presentationml/2006/main">
   <p:cSld>
@@ -6557,7 +6644,7 @@
           <p:cNvPr id="2" name="Title 1">
             <a:extLst>
               <a:ext uri="{FF2B5EF4-FFF2-40B4-BE49-F238E27FC236}">
-                <a16:creationId xmlns:a16="http://schemas.microsoft.com/office/drawing/2014/main" id="{32E74C97-A756-314C-9138-6FCB8D75C65C}"/>
+                <a16:creationId xmlns:a16="http://schemas.microsoft.com/office/drawing/2014/main" id="{8C423E2D-7FEA-594C-92F2-E540450CB479}"/>
               </a:ext>
             </a:extLst>
           </p:cNvPr>
@@ -6575,17 +6662,17 @@
           <a:p>
             <a:r>
               <a:rPr lang="en-US" dirty="0"/>
-              <a:t>Us media sentiment</a:t>
+              <a:t>World media sentiment</a:t>
             </a:r>
           </a:p>
         </p:txBody>
       </p:sp>
       <p:pic>
         <p:nvPicPr>
-          <p:cNvPr id="5" name="Content Placeholder 4">
+          <p:cNvPr id="6" name="Content Placeholder 5">
             <a:extLst>
               <a:ext uri="{FF2B5EF4-FFF2-40B4-BE49-F238E27FC236}">
-                <a16:creationId xmlns:a16="http://schemas.microsoft.com/office/drawing/2014/main" id="{4D34E9AC-8A3B-F34B-B55A-002A4E044B26}"/>
+                <a16:creationId xmlns:a16="http://schemas.microsoft.com/office/drawing/2014/main" id="{5C8DB2C2-FC02-C747-80F8-82AA560382E5}"/>
               </a:ext>
             </a:extLst>
           </p:cNvPr>
@@ -6604,15 +6691,15 @@
         </p:blipFill>
         <p:spPr>
           <a:xfrm>
-            <a:off x="862164" y="2193925"/>
-            <a:ext cx="10467672" cy="4024313"/>
+            <a:off x="1511546" y="2193925"/>
+            <a:ext cx="9168907" cy="4024313"/>
           </a:xfrm>
         </p:spPr>
       </p:pic>
     </p:spTree>
     <p:extLst>
       <p:ext uri="{BB962C8B-B14F-4D97-AF65-F5344CB8AC3E}">
-        <p14:creationId xmlns:p14="http://schemas.microsoft.com/office/powerpoint/2010/main" val="3751202882"/>
+        <p14:creationId xmlns:p14="http://schemas.microsoft.com/office/powerpoint/2010/main" val="2933957669"/>
       </p:ext>
     </p:extLst>
   </p:cSld>
@@ -6644,6 +6731,93 @@
           <p:cNvPr id="2" name="Title 1">
             <a:extLst>
               <a:ext uri="{FF2B5EF4-FFF2-40B4-BE49-F238E27FC236}">
+                <a16:creationId xmlns:a16="http://schemas.microsoft.com/office/drawing/2014/main" id="{32E74C97-A756-314C-9138-6FCB8D75C65C}"/>
+              </a:ext>
+            </a:extLst>
+          </p:cNvPr>
+          <p:cNvSpPr>
+            <a:spLocks noGrp="1"/>
+          </p:cNvSpPr>
+          <p:nvPr>
+            <p:ph type="title"/>
+          </p:nvPr>
+        </p:nvSpPr>
+        <p:spPr/>
+        <p:txBody>
+          <a:bodyPr/>
+          <a:lstStyle/>
+          <a:p>
+            <a:r>
+              <a:rPr lang="en-US" dirty="0"/>
+              <a:t>Us media sentiment</a:t>
+            </a:r>
+          </a:p>
+        </p:txBody>
+      </p:sp>
+      <p:pic>
+        <p:nvPicPr>
+          <p:cNvPr id="6" name="Content Placeholder 5">
+            <a:extLst>
+              <a:ext uri="{FF2B5EF4-FFF2-40B4-BE49-F238E27FC236}">
+                <a16:creationId xmlns:a16="http://schemas.microsoft.com/office/drawing/2014/main" id="{EF970FF7-47BA-4448-8F33-07129D700AAA}"/>
+              </a:ext>
+            </a:extLst>
+          </p:cNvPr>
+          <p:cNvPicPr>
+            <a:picLocks noGrp="1" noChangeAspect="1"/>
+          </p:cNvPicPr>
+          <p:nvPr>
+            <p:ph idx="1"/>
+          </p:nvPr>
+        </p:nvPicPr>
+        <p:blipFill>
+          <a:blip r:embed="rId2"/>
+          <a:stretch>
+            <a:fillRect/>
+          </a:stretch>
+        </p:blipFill>
+        <p:spPr>
+          <a:xfrm>
+            <a:off x="1073970" y="2193925"/>
+            <a:ext cx="10044060" cy="4024313"/>
+          </a:xfrm>
+        </p:spPr>
+      </p:pic>
+    </p:spTree>
+    <p:extLst>
+      <p:ext uri="{BB962C8B-B14F-4D97-AF65-F5344CB8AC3E}">
+        <p14:creationId xmlns:p14="http://schemas.microsoft.com/office/powerpoint/2010/main" val="3751202882"/>
+      </p:ext>
+    </p:extLst>
+  </p:cSld>
+  <p:clrMapOvr>
+    <a:masterClrMapping/>
+  </p:clrMapOvr>
+</p:sld>
+</file>
+
+<file path=ppt/slides/slide9.xml><?xml version="1.0" encoding="utf-8"?>
+<p:sld xmlns:a="http://schemas.openxmlformats.org/drawingml/2006/main" xmlns:r="http://schemas.openxmlformats.org/officeDocument/2006/relationships" xmlns:p="http://schemas.openxmlformats.org/presentationml/2006/main">
+  <p:cSld>
+    <p:spTree>
+      <p:nvGrpSpPr>
+        <p:cNvPr id="1" name=""/>
+        <p:cNvGrpSpPr/>
+        <p:nvPr/>
+      </p:nvGrpSpPr>
+      <p:grpSpPr>
+        <a:xfrm>
+          <a:off x="0" y="0"/>
+          <a:ext cx="0" cy="0"/>
+          <a:chOff x="0" y="0"/>
+          <a:chExt cx="0" cy="0"/>
+        </a:xfrm>
+      </p:grpSpPr>
+      <p:sp>
+        <p:nvSpPr>
+          <p:cNvPr id="2" name="Title 1">
+            <a:extLst>
+              <a:ext uri="{FF2B5EF4-FFF2-40B4-BE49-F238E27FC236}">
                 <a16:creationId xmlns:a16="http://schemas.microsoft.com/office/drawing/2014/main" id="{2CEE07B7-33FD-894E-97FA-612810E2B07D}"/>
               </a:ext>
             </a:extLst>
@@ -6690,16 +6864,23 @@
           <a:p>
             <a:r>
               <a:rPr lang="en-US" dirty="0"/>
-              <a:t>Are we in sync with the rest of the world</a:t>
+              <a:t>Are we in sync with the rest of the world?</a:t>
             </a:r>
           </a:p>
           <a:p>
             <a:r>
               <a:rPr lang="en-US" dirty="0"/>
-              <a:t>How much of out thinking and decisions are based on what our media influence?</a:t>
-            </a:r>
-          </a:p>
-          <a:p>
+              <a:t>How much of our thinking and decisions are due to our media - influence?</a:t>
+            </a:r>
+          </a:p>
+          <a:p>
+            <a:r>
+              <a:rPr lang="en-US" dirty="0"/>
+              <a:t>This data is just a start – </a:t>
+            </a:r>
+          </a:p>
+          <a:p>
+            <a:pPr lvl="1"/>
             <a:r>
               <a:rPr lang="en-US" dirty="0"/>
               <a:t>More analysis on the topic will shed insights on the current and emerging trends in the fields of finance, medicine, politics, etc. and how they are being given the direction by the media.</a:t>
@@ -6908,6 +7089,67 @@
                       </p:childTnLst>
                     </p:cTn>
                   </p:par>
+                  <p:par>
+                    <p:cTn id="18" fill="hold">
+                      <p:stCondLst>
+                        <p:cond delay="indefinite"/>
+                      </p:stCondLst>
+                      <p:childTnLst>
+                        <p:par>
+                          <p:cTn id="19" fill="hold">
+                            <p:stCondLst>
+                              <p:cond delay="0"/>
+                            </p:stCondLst>
+                            <p:childTnLst>
+                              <p:par>
+                                <p:cTn id="20" presetID="3" presetClass="entr" presetSubtype="10" fill="hold" nodeType="clickEffect">
+                                  <p:stCondLst>
+                                    <p:cond delay="0"/>
+                                  </p:stCondLst>
+                                  <p:childTnLst>
+                                    <p:set>
+                                      <p:cBhvr>
+                                        <p:cTn id="21" dur="1" fill="hold">
+                                          <p:stCondLst>
+                                            <p:cond delay="0"/>
+                                          </p:stCondLst>
+                                        </p:cTn>
+                                        <p:tgtEl>
+                                          <p:spTgt spid="3">
+                                            <p:txEl>
+                                              <p:pRg st="3" end="3"/>
+                                            </p:txEl>
+                                          </p:spTgt>
+                                        </p:tgtEl>
+                                        <p:attrNameLst>
+                                          <p:attrName>style.visibility</p:attrName>
+                                        </p:attrNameLst>
+                                      </p:cBhvr>
+                                      <p:to>
+                                        <p:strVal val="visible"/>
+                                      </p:to>
+                                    </p:set>
+                                    <p:animEffect transition="in" filter="blinds(horizontal)">
+                                      <p:cBhvr>
+                                        <p:cTn id="22" dur="500"/>
+                                        <p:tgtEl>
+                                          <p:spTgt spid="3">
+                                            <p:txEl>
+                                              <p:pRg st="3" end="3"/>
+                                            </p:txEl>
+                                          </p:spTgt>
+                                        </p:tgtEl>
+                                      </p:cBhvr>
+                                    </p:animEffect>
+                                  </p:childTnLst>
+                                </p:cTn>
+                              </p:par>
+                            </p:childTnLst>
+                          </p:cTn>
+                        </p:par>
+                      </p:childTnLst>
+                    </p:cTn>
+                  </p:par>
                 </p:childTnLst>
               </p:cTn>
               <p:prevCondLst>
@@ -6930,92 +7172,6 @@
       </p:par>
     </p:tnLst>
   </p:timing>
-</p:sld>
-</file>
-
-<file path=ppt/slides/slide9.xml><?xml version="1.0" encoding="utf-8"?>
-<p:sld xmlns:a="http://schemas.openxmlformats.org/drawingml/2006/main" xmlns:r="http://schemas.openxmlformats.org/officeDocument/2006/relationships" xmlns:p="http://schemas.openxmlformats.org/presentationml/2006/main">
-  <p:cSld>
-    <p:spTree>
-      <p:nvGrpSpPr>
-        <p:cNvPr id="1" name=""/>
-        <p:cNvGrpSpPr/>
-        <p:nvPr/>
-      </p:nvGrpSpPr>
-      <p:grpSpPr>
-        <a:xfrm>
-          <a:off x="0" y="0"/>
-          <a:ext cx="0" cy="0"/>
-          <a:chOff x="0" y="0"/>
-          <a:chExt cx="0" cy="0"/>
-        </a:xfrm>
-      </p:grpSpPr>
-      <p:sp>
-        <p:nvSpPr>
-          <p:cNvPr id="2" name="Title 1">
-            <a:extLst>
-              <a:ext uri="{FF2B5EF4-FFF2-40B4-BE49-F238E27FC236}">
-                <a16:creationId xmlns:a16="http://schemas.microsoft.com/office/drawing/2014/main" id="{98569654-12C3-2F4F-BA71-ACE02C875588}"/>
-              </a:ext>
-            </a:extLst>
-          </p:cNvPr>
-          <p:cNvSpPr>
-            <a:spLocks noGrp="1"/>
-          </p:cNvSpPr>
-          <p:nvPr>
-            <p:ph type="title"/>
-          </p:nvPr>
-        </p:nvSpPr>
-        <p:spPr/>
-        <p:txBody>
-          <a:bodyPr/>
-          <a:lstStyle/>
-          <a:p>
-            <a:r>
-              <a:rPr lang="en-US" dirty="0"/>
-              <a:t>Q &amp; A</a:t>
-            </a:r>
-          </a:p>
-        </p:txBody>
-      </p:sp>
-      <p:sp>
-        <p:nvSpPr>
-          <p:cNvPr id="3" name="Content Placeholder 2">
-            <a:extLst>
-              <a:ext uri="{FF2B5EF4-FFF2-40B4-BE49-F238E27FC236}">
-                <a16:creationId xmlns:a16="http://schemas.microsoft.com/office/drawing/2014/main" id="{EDF538AD-3DBF-0740-AEA6-A0D34315502D}"/>
-              </a:ext>
-            </a:extLst>
-          </p:cNvPr>
-          <p:cNvSpPr>
-            <a:spLocks noGrp="1"/>
-          </p:cNvSpPr>
-          <p:nvPr>
-            <p:ph idx="1"/>
-          </p:nvPr>
-        </p:nvSpPr>
-        <p:spPr/>
-        <p:txBody>
-          <a:bodyPr/>
-          <a:lstStyle/>
-          <a:p>
-            <a:r>
-              <a:rPr lang="en-US" dirty="0"/>
-              <a:t>Thanks!</a:t>
-            </a:r>
-          </a:p>
-        </p:txBody>
-      </p:sp>
-    </p:spTree>
-    <p:extLst>
-      <p:ext uri="{BB962C8B-B14F-4D97-AF65-F5344CB8AC3E}">
-        <p14:creationId xmlns:p14="http://schemas.microsoft.com/office/powerpoint/2010/main" val="489272128"/>
-      </p:ext>
-    </p:extLst>
-  </p:cSld>
-  <p:clrMapOvr>
-    <a:masterClrMapping/>
-  </p:clrMapOvr>
 </p:sld>
 </file>
 

</xml_diff>

<commit_message>
Added issues and quotes.
</commit_message>
<xml_diff>
--- a/Project1-Presentation.pptx
+++ b/Project1-Presentation.pptx
@@ -14,7 +14,12 @@
     <p:sldId id="263" r:id="rId8"/>
     <p:sldId id="264" r:id="rId9"/>
     <p:sldId id="259" r:id="rId10"/>
-    <p:sldId id="260" r:id="rId11"/>
+    <p:sldId id="267" r:id="rId11"/>
+    <p:sldId id="268" r:id="rId12"/>
+    <p:sldId id="266" r:id="rId13"/>
+    <p:sldId id="270" r:id="rId14"/>
+    <p:sldId id="269" r:id="rId15"/>
+    <p:sldId id="260" r:id="rId16"/>
   </p:sldIdLst>
   <p:sldSz cx="12192000" cy="6858000"/>
   <p:notesSz cx="6858000" cy="9144000"/>
@@ -5749,6 +5754,525 @@
 </file>
 
 <file path=ppt/slides/slide10.xml><?xml version="1.0" encoding="utf-8"?>
+<p:sld xmlns:a="http://schemas.openxmlformats.org/drawingml/2006/main" xmlns:r="http://schemas.openxmlformats.org/officeDocument/2006/relationships" xmlns:p="http://schemas.openxmlformats.org/presentationml/2006/main">
+  <p:cSld>
+    <p:spTree>
+      <p:nvGrpSpPr>
+        <p:cNvPr id="1" name=""/>
+        <p:cNvGrpSpPr/>
+        <p:nvPr/>
+      </p:nvGrpSpPr>
+      <p:grpSpPr>
+        <a:xfrm>
+          <a:off x="0" y="0"/>
+          <a:ext cx="0" cy="0"/>
+          <a:chOff x="0" y="0"/>
+          <a:chExt cx="0" cy="0"/>
+        </a:xfrm>
+      </p:grpSpPr>
+      <p:sp>
+        <p:nvSpPr>
+          <p:cNvPr id="2" name="Title 1">
+            <a:extLst>
+              <a:ext uri="{FF2B5EF4-FFF2-40B4-BE49-F238E27FC236}">
+                <a16:creationId xmlns:a16="http://schemas.microsoft.com/office/drawing/2014/main" id="{B4E3E2CA-9C67-734C-961C-39A821CA6825}"/>
+              </a:ext>
+            </a:extLst>
+          </p:cNvPr>
+          <p:cNvSpPr>
+            <a:spLocks noGrp="1"/>
+          </p:cNvSpPr>
+          <p:nvPr>
+            <p:ph type="title"/>
+          </p:nvPr>
+        </p:nvSpPr>
+        <p:spPr/>
+        <p:txBody>
+          <a:bodyPr/>
+          <a:lstStyle/>
+          <a:p>
+            <a:r>
+              <a:rPr lang="en-US" dirty="0"/>
+              <a:t>WORLD headlines sentiment </a:t>
+            </a:r>
+            <a:r>
+              <a:rPr lang="en-US" dirty="0" err="1"/>
+              <a:t>dataframe</a:t>
+            </a:r>
+            <a:endParaRPr lang="en-US" dirty="0"/>
+          </a:p>
+        </p:txBody>
+      </p:sp>
+      <p:pic>
+        <p:nvPicPr>
+          <p:cNvPr id="5" name="Content Placeholder 4">
+            <a:extLst>
+              <a:ext uri="{FF2B5EF4-FFF2-40B4-BE49-F238E27FC236}">
+                <a16:creationId xmlns:a16="http://schemas.microsoft.com/office/drawing/2014/main" id="{2EAF1B84-47AD-8E47-821C-267B34A0351F}"/>
+              </a:ext>
+            </a:extLst>
+          </p:cNvPr>
+          <p:cNvPicPr>
+            <a:picLocks noGrp="1" noChangeAspect="1"/>
+          </p:cNvPicPr>
+          <p:nvPr>
+            <p:ph idx="1"/>
+          </p:nvPr>
+        </p:nvPicPr>
+        <p:blipFill>
+          <a:blip r:embed="rId2"/>
+          <a:stretch>
+            <a:fillRect/>
+          </a:stretch>
+        </p:blipFill>
+        <p:spPr>
+          <a:xfrm>
+            <a:off x="3568620" y="2193925"/>
+            <a:ext cx="5054759" cy="4024313"/>
+          </a:xfrm>
+        </p:spPr>
+      </p:pic>
+    </p:spTree>
+    <p:extLst>
+      <p:ext uri="{BB962C8B-B14F-4D97-AF65-F5344CB8AC3E}">
+        <p14:creationId xmlns:p14="http://schemas.microsoft.com/office/powerpoint/2010/main" val="1738784076"/>
+      </p:ext>
+    </p:extLst>
+  </p:cSld>
+  <p:clrMapOvr>
+    <a:masterClrMapping/>
+  </p:clrMapOvr>
+</p:sld>
+</file>
+
+<file path=ppt/slides/slide11.xml><?xml version="1.0" encoding="utf-8"?>
+<p:sld xmlns:a="http://schemas.openxmlformats.org/drawingml/2006/main" xmlns:r="http://schemas.openxmlformats.org/officeDocument/2006/relationships" xmlns:p="http://schemas.openxmlformats.org/presentationml/2006/main">
+  <p:cSld>
+    <p:spTree>
+      <p:nvGrpSpPr>
+        <p:cNvPr id="1" name=""/>
+        <p:cNvGrpSpPr/>
+        <p:nvPr/>
+      </p:nvGrpSpPr>
+      <p:grpSpPr>
+        <a:xfrm>
+          <a:off x="0" y="0"/>
+          <a:ext cx="0" cy="0"/>
+          <a:chOff x="0" y="0"/>
+          <a:chExt cx="0" cy="0"/>
+        </a:xfrm>
+      </p:grpSpPr>
+      <p:sp>
+        <p:nvSpPr>
+          <p:cNvPr id="2" name="Title 1">
+            <a:extLst>
+              <a:ext uri="{FF2B5EF4-FFF2-40B4-BE49-F238E27FC236}">
+                <a16:creationId xmlns:a16="http://schemas.microsoft.com/office/drawing/2014/main" id="{188732F1-2C79-8648-B185-92F5FBC2B349}"/>
+              </a:ext>
+            </a:extLst>
+          </p:cNvPr>
+          <p:cNvSpPr>
+            <a:spLocks noGrp="1"/>
+          </p:cNvSpPr>
+          <p:nvPr>
+            <p:ph type="title"/>
+          </p:nvPr>
+        </p:nvSpPr>
+        <p:spPr/>
+        <p:txBody>
+          <a:bodyPr>
+            <a:normAutofit/>
+          </a:bodyPr>
+          <a:lstStyle/>
+          <a:p>
+            <a:r>
+              <a:rPr lang="en-US" dirty="0"/>
+              <a:t>Us headline sentiment </a:t>
+            </a:r>
+            <a:r>
+              <a:rPr lang="en-US" dirty="0" err="1"/>
+              <a:t>dataframe</a:t>
+            </a:r>
+            <a:endParaRPr lang="en-US" dirty="0"/>
+          </a:p>
+        </p:txBody>
+      </p:sp>
+      <p:pic>
+        <p:nvPicPr>
+          <p:cNvPr id="5" name="Content Placeholder 4">
+            <a:extLst>
+              <a:ext uri="{FF2B5EF4-FFF2-40B4-BE49-F238E27FC236}">
+                <a16:creationId xmlns:a16="http://schemas.microsoft.com/office/drawing/2014/main" id="{C322B4C5-5562-B243-943A-D1D0AC105451}"/>
+              </a:ext>
+            </a:extLst>
+          </p:cNvPr>
+          <p:cNvPicPr>
+            <a:picLocks noGrp="1" noChangeAspect="1"/>
+          </p:cNvPicPr>
+          <p:nvPr>
+            <p:ph idx="1"/>
+          </p:nvPr>
+        </p:nvPicPr>
+        <p:blipFill>
+          <a:blip r:embed="rId2"/>
+          <a:stretch>
+            <a:fillRect/>
+          </a:stretch>
+        </p:blipFill>
+        <p:spPr>
+          <a:xfrm>
+            <a:off x="3635539" y="2193925"/>
+            <a:ext cx="4920921" cy="4024313"/>
+          </a:xfrm>
+        </p:spPr>
+      </p:pic>
+    </p:spTree>
+    <p:extLst>
+      <p:ext uri="{BB962C8B-B14F-4D97-AF65-F5344CB8AC3E}">
+        <p14:creationId xmlns:p14="http://schemas.microsoft.com/office/powerpoint/2010/main" val="126317155"/>
+      </p:ext>
+    </p:extLst>
+  </p:cSld>
+  <p:clrMapOvr>
+    <a:masterClrMapping/>
+  </p:clrMapOvr>
+</p:sld>
+</file>
+
+<file path=ppt/slides/slide12.xml><?xml version="1.0" encoding="utf-8"?>
+<p:sld xmlns:a="http://schemas.openxmlformats.org/drawingml/2006/main" xmlns:r="http://schemas.openxmlformats.org/officeDocument/2006/relationships" xmlns:p="http://schemas.openxmlformats.org/presentationml/2006/main">
+  <p:cSld>
+    <p:spTree>
+      <p:nvGrpSpPr>
+        <p:cNvPr id="1" name=""/>
+        <p:cNvGrpSpPr/>
+        <p:nvPr/>
+      </p:nvGrpSpPr>
+      <p:grpSpPr>
+        <a:xfrm>
+          <a:off x="0" y="0"/>
+          <a:ext cx="0" cy="0"/>
+          <a:chOff x="0" y="0"/>
+          <a:chExt cx="0" cy="0"/>
+        </a:xfrm>
+      </p:grpSpPr>
+      <p:sp>
+        <p:nvSpPr>
+          <p:cNvPr id="2" name="Title 1">
+            <a:extLst>
+              <a:ext uri="{FF2B5EF4-FFF2-40B4-BE49-F238E27FC236}">
+                <a16:creationId xmlns:a16="http://schemas.microsoft.com/office/drawing/2014/main" id="{9B852B4E-E831-ED47-8A87-4BEF5F1DB760}"/>
+              </a:ext>
+            </a:extLst>
+          </p:cNvPr>
+          <p:cNvSpPr>
+            <a:spLocks noGrp="1"/>
+          </p:cNvSpPr>
+          <p:nvPr>
+            <p:ph type="title"/>
+          </p:nvPr>
+        </p:nvSpPr>
+        <p:spPr/>
+        <p:txBody>
+          <a:bodyPr/>
+          <a:lstStyle/>
+          <a:p>
+            <a:r>
+              <a:rPr lang="en-US" dirty="0"/>
+              <a:t>QUOTE</a:t>
+            </a:r>
+          </a:p>
+        </p:txBody>
+      </p:sp>
+      <p:sp>
+        <p:nvSpPr>
+          <p:cNvPr id="3" name="Content Placeholder 2">
+            <a:extLst>
+              <a:ext uri="{FF2B5EF4-FFF2-40B4-BE49-F238E27FC236}">
+                <a16:creationId xmlns:a16="http://schemas.microsoft.com/office/drawing/2014/main" id="{A2B70E51-DA9B-7C48-8BAA-56905BEA6972}"/>
+              </a:ext>
+            </a:extLst>
+          </p:cNvPr>
+          <p:cNvSpPr>
+            <a:spLocks noGrp="1"/>
+          </p:cNvSpPr>
+          <p:nvPr>
+            <p:ph idx="1"/>
+          </p:nvPr>
+        </p:nvSpPr>
+        <p:spPr/>
+        <p:txBody>
+          <a:bodyPr>
+            <a:normAutofit fontScale="92500" lnSpcReduction="10000"/>
+          </a:bodyPr>
+          <a:lstStyle/>
+          <a:p>
+            <a:r>
+              <a:rPr lang="en-US" dirty="0"/>
+              <a:t>“I have a foreboding of an America in my children's or grandchildren's time -- when the United States is a service and information economy; when nearly all the manufacturing industries have slipped away to other countries; when awesome technological powers are in the hands of a very few, and no one representing the public interest can even grasp the issues; when the people have lost the ability to set their own agendas or knowledgeably question those in authority; when, clutching our crystals and nervously consulting our horoscopes, our critical faculties in decline, unable to distinguish between what feels good and what's true, we slide, almost without noticing, back into superstition and darkness...</a:t>
+            </a:r>
+            <a:br>
+              <a:rPr lang="en-US" dirty="0"/>
+            </a:br>
+            <a:br>
+              <a:rPr lang="en-US" dirty="0"/>
+            </a:br>
+            <a:r>
+              <a:rPr lang="en-US" dirty="0"/>
+              <a:t>The dumbing down of American is most evident in the slow decay of substantive content in the enormously influential media, the 30 second sound bites (now down to 10 seconds or less), lowest common denominator programming, credulous presentations on pseudoscience and superstition, but especially a kind of celebration of ignorance” </a:t>
+            </a:r>
+            <a:br>
+              <a:rPr lang="en-US" dirty="0"/>
+            </a:br>
+            <a:r>
+              <a:rPr lang="en-US" dirty="0"/>
+              <a:t>― </a:t>
+            </a:r>
+            <a:r>
+              <a:rPr lang="en-US" b="1" dirty="0">
+                <a:hlinkClick r:id="rId2"/>
+              </a:rPr>
+              <a:t>Carl Sagan</a:t>
+            </a:r>
+            <a:r>
+              <a:rPr lang="en-US" dirty="0"/>
+              <a:t>, </a:t>
+            </a:r>
+            <a:r>
+              <a:rPr lang="en-US" b="1" dirty="0">
+                <a:hlinkClick r:id="rId3"/>
+              </a:rPr>
+              <a:t>The Demon-Haunted World: Science as a Candle in the Dark</a:t>
+            </a:r>
+            <a:endParaRPr lang="en-US" dirty="0"/>
+          </a:p>
+        </p:txBody>
+      </p:sp>
+    </p:spTree>
+    <p:extLst>
+      <p:ext uri="{BB962C8B-B14F-4D97-AF65-F5344CB8AC3E}">
+        <p14:creationId xmlns:p14="http://schemas.microsoft.com/office/powerpoint/2010/main" val="1933878939"/>
+      </p:ext>
+    </p:extLst>
+  </p:cSld>
+  <p:clrMapOvr>
+    <a:masterClrMapping/>
+  </p:clrMapOvr>
+</p:sld>
+</file>
+
+<file path=ppt/slides/slide13.xml><?xml version="1.0" encoding="utf-8"?>
+<p:sld xmlns:a="http://schemas.openxmlformats.org/drawingml/2006/main" xmlns:r="http://schemas.openxmlformats.org/officeDocument/2006/relationships" xmlns:p="http://schemas.openxmlformats.org/presentationml/2006/main">
+  <p:cSld>
+    <p:spTree>
+      <p:nvGrpSpPr>
+        <p:cNvPr id="1" name=""/>
+        <p:cNvGrpSpPr/>
+        <p:nvPr/>
+      </p:nvGrpSpPr>
+      <p:grpSpPr>
+        <a:xfrm>
+          <a:off x="0" y="0"/>
+          <a:ext cx="0" cy="0"/>
+          <a:chOff x="0" y="0"/>
+          <a:chExt cx="0" cy="0"/>
+        </a:xfrm>
+      </p:grpSpPr>
+      <p:sp>
+        <p:nvSpPr>
+          <p:cNvPr id="2" name="Title 1">
+            <a:extLst>
+              <a:ext uri="{FF2B5EF4-FFF2-40B4-BE49-F238E27FC236}">
+                <a16:creationId xmlns:a16="http://schemas.microsoft.com/office/drawing/2014/main" id="{B039FC73-0E54-9343-BEE0-67C113937BA0}"/>
+              </a:ext>
+            </a:extLst>
+          </p:cNvPr>
+          <p:cNvSpPr>
+            <a:spLocks noGrp="1"/>
+          </p:cNvSpPr>
+          <p:nvPr>
+            <p:ph type="title"/>
+          </p:nvPr>
+        </p:nvSpPr>
+        <p:spPr/>
+        <p:txBody>
+          <a:bodyPr/>
+          <a:lstStyle/>
+          <a:p>
+            <a:r>
+              <a:rPr lang="en-US" dirty="0"/>
+              <a:t>Quote</a:t>
+            </a:r>
+          </a:p>
+        </p:txBody>
+      </p:sp>
+      <p:pic>
+        <p:nvPicPr>
+          <p:cNvPr id="5" name="Content Placeholder 4">
+            <a:extLst>
+              <a:ext uri="{FF2B5EF4-FFF2-40B4-BE49-F238E27FC236}">
+                <a16:creationId xmlns:a16="http://schemas.microsoft.com/office/drawing/2014/main" id="{A3A09B29-D326-D94B-8F6B-1B70958E44B8}"/>
+              </a:ext>
+            </a:extLst>
+          </p:cNvPr>
+          <p:cNvPicPr>
+            <a:picLocks noGrp="1" noChangeAspect="1"/>
+          </p:cNvPicPr>
+          <p:nvPr>
+            <p:ph idx="1"/>
+          </p:nvPr>
+        </p:nvPicPr>
+        <p:blipFill>
+          <a:blip r:embed="rId2"/>
+          <a:stretch>
+            <a:fillRect/>
+          </a:stretch>
+        </p:blipFill>
+        <p:spPr>
+          <a:xfrm>
+            <a:off x="2082800" y="2383631"/>
+            <a:ext cx="8026400" cy="3644900"/>
+          </a:xfrm>
+        </p:spPr>
+      </p:pic>
+    </p:spTree>
+    <p:extLst>
+      <p:ext uri="{BB962C8B-B14F-4D97-AF65-F5344CB8AC3E}">
+        <p14:creationId xmlns:p14="http://schemas.microsoft.com/office/powerpoint/2010/main" val="2260565873"/>
+      </p:ext>
+    </p:extLst>
+  </p:cSld>
+  <p:clrMapOvr>
+    <a:masterClrMapping/>
+  </p:clrMapOvr>
+</p:sld>
+</file>
+
+<file path=ppt/slides/slide14.xml><?xml version="1.0" encoding="utf-8"?>
+<p:sld xmlns:a="http://schemas.openxmlformats.org/drawingml/2006/main" xmlns:r="http://schemas.openxmlformats.org/officeDocument/2006/relationships" xmlns:p="http://schemas.openxmlformats.org/presentationml/2006/main">
+  <p:cSld>
+    <p:spTree>
+      <p:nvGrpSpPr>
+        <p:cNvPr id="1" name=""/>
+        <p:cNvGrpSpPr/>
+        <p:nvPr/>
+      </p:nvGrpSpPr>
+      <p:grpSpPr>
+        <a:xfrm>
+          <a:off x="0" y="0"/>
+          <a:ext cx="0" cy="0"/>
+          <a:chOff x="0" y="0"/>
+          <a:chExt cx="0" cy="0"/>
+        </a:xfrm>
+      </p:grpSpPr>
+      <p:sp>
+        <p:nvSpPr>
+          <p:cNvPr id="2" name="Title 1">
+            <a:extLst>
+              <a:ext uri="{FF2B5EF4-FFF2-40B4-BE49-F238E27FC236}">
+                <a16:creationId xmlns:a16="http://schemas.microsoft.com/office/drawing/2014/main" id="{B93EFA6D-9C8B-584E-83D7-CF1AD9F731BE}"/>
+              </a:ext>
+            </a:extLst>
+          </p:cNvPr>
+          <p:cNvSpPr>
+            <a:spLocks noGrp="1"/>
+          </p:cNvSpPr>
+          <p:nvPr>
+            <p:ph type="title"/>
+          </p:nvPr>
+        </p:nvSpPr>
+        <p:spPr/>
+        <p:txBody>
+          <a:bodyPr/>
+          <a:lstStyle/>
+          <a:p>
+            <a:r>
+              <a:rPr lang="en-US" dirty="0"/>
+              <a:t>Issues we faced</a:t>
+            </a:r>
+          </a:p>
+        </p:txBody>
+      </p:sp>
+      <p:sp>
+        <p:nvSpPr>
+          <p:cNvPr id="3" name="Content Placeholder 2">
+            <a:extLst>
+              <a:ext uri="{FF2B5EF4-FFF2-40B4-BE49-F238E27FC236}">
+                <a16:creationId xmlns:a16="http://schemas.microsoft.com/office/drawing/2014/main" id="{EE389360-E245-7B45-9811-832FAB10ADBC}"/>
+              </a:ext>
+            </a:extLst>
+          </p:cNvPr>
+          <p:cNvSpPr>
+            <a:spLocks noGrp="1"/>
+          </p:cNvSpPr>
+          <p:nvPr>
+            <p:ph idx="1"/>
+          </p:nvPr>
+        </p:nvSpPr>
+        <p:spPr/>
+        <p:txBody>
+          <a:bodyPr/>
+          <a:lstStyle/>
+          <a:p>
+            <a:r>
+              <a:rPr lang="en-US" dirty="0"/>
+              <a:t>The </a:t>
+            </a:r>
+            <a:r>
+              <a:rPr lang="en-US" dirty="0" err="1"/>
+              <a:t>NewsAPI</a:t>
+            </a:r>
+            <a:r>
+              <a:rPr lang="en-US" dirty="0"/>
+              <a:t> was used to pull the data from the start. </a:t>
+            </a:r>
+          </a:p>
+          <a:p>
+            <a:pPr lvl="1"/>
+            <a:r>
+              <a:rPr lang="en-US" dirty="0"/>
+              <a:t>Issues: Result set was limited to only 20 results, using the country and category parameters.</a:t>
+            </a:r>
+          </a:p>
+          <a:p>
+            <a:pPr lvl="1"/>
+            <a:r>
+              <a:rPr lang="en-US" dirty="0"/>
+              <a:t>Last minute policy change: The maximum number of articles that can be pulled for non parametrized query was limited to 100.</a:t>
+            </a:r>
+          </a:p>
+          <a:p>
+            <a:r>
+              <a:rPr lang="en-US" dirty="0"/>
+              <a:t>Heat Map generation and tuning – learning growth </a:t>
+            </a:r>
+            <a:r>
+              <a:rPr lang="en-US" dirty="0">
+                <a:sym typeface="Wingdings" pitchFamily="2" charset="2"/>
+              </a:rPr>
+              <a:t></a:t>
+            </a:r>
+            <a:r>
+              <a:rPr lang="en-US" dirty="0"/>
+              <a:t>.</a:t>
+            </a:r>
+          </a:p>
+        </p:txBody>
+      </p:sp>
+    </p:spTree>
+    <p:extLst>
+      <p:ext uri="{BB962C8B-B14F-4D97-AF65-F5344CB8AC3E}">
+        <p14:creationId xmlns:p14="http://schemas.microsoft.com/office/powerpoint/2010/main" val="947774453"/>
+      </p:ext>
+    </p:extLst>
+  </p:cSld>
+  <p:clrMapOvr>
+    <a:masterClrMapping/>
+  </p:clrMapOvr>
+</p:sld>
+</file>
+
+<file path=ppt/slides/slide15.xml><?xml version="1.0" encoding="utf-8"?>
 <p:sld xmlns:a="http://schemas.openxmlformats.org/drawingml/2006/main" xmlns:r="http://schemas.openxmlformats.org/officeDocument/2006/relationships" xmlns:p="http://schemas.openxmlformats.org/presentationml/2006/main">
   <p:cSld>
     <p:spTree>

</xml_diff>